<commit_message>
More changes to app.js and powerpoint
</commit_message>
<xml_diff>
--- a/JavaScriptTheWeirdParts.pptx
+++ b/JavaScriptTheWeirdParts.pptx
@@ -3158,7 +3158,11 @@
           <a:p>
             <a:r>
               <a:rPr lang="en-NZ" dirty="0" smtClean="0"/>
-              <a:t>prototype</a:t>
+              <a:t>P</a:t>
+            </a:r>
+            <a:r>
+              <a:rPr lang="en-NZ" dirty="0" smtClean="0"/>
+              <a:t>rototype</a:t>
             </a:r>
             <a:endParaRPr lang="en-NZ" dirty="0"/>
           </a:p>
@@ -3176,9 +3180,21 @@
         </p:nvSpPr>
         <p:spPr/>
         <p:txBody>
-          <a:bodyPr/>
-          <a:lstStyle/>
-          <a:p>
+          <a:bodyPr>
+            <a:normAutofit fontScale="92500"/>
+          </a:bodyPr>
+          <a:lstStyle/>
+          <a:p>
+            <a:r>
+              <a:rPr lang="en-NZ" dirty="0" smtClean="0"/>
+              <a:t>Every object has a prototype except the base object.</a:t>
+            </a:r>
+          </a:p>
+          <a:p>
+            <a:r>
+              <a:rPr lang="en-NZ" dirty="0" smtClean="0"/>
+              <a:t>JavaScript objects have a link to a prototype object. When trying to access a property of an object, the property will not only be sought on the object but on the prototype of the object, the prototype of the prototype, and so on until either a property with a matching name is found or the end of the prototype chain is reached.</a:t>
+            </a:r>
             <a:endParaRPr lang="en-NZ" dirty="0"/>
           </a:p>
         </p:txBody>
@@ -3292,11 +3308,7 @@
           <a:p>
             <a:r>
               <a:rPr lang="en-NZ" dirty="0" smtClean="0"/>
-              <a:t>really weird </a:t>
-            </a:r>
-            <a:r>
-              <a:rPr lang="en-NZ" dirty="0" smtClean="0"/>
-              <a:t>Stuff</a:t>
+              <a:t>really weird Stuff</a:t>
             </a:r>
             <a:endParaRPr lang="en-NZ" dirty="0"/>
           </a:p>
@@ -3892,11 +3904,7 @@
           <a:p>
             <a:r>
               <a:rPr lang="en-NZ" dirty="0" smtClean="0"/>
-              <a:t>The execution context - Creation and </a:t>
-            </a:r>
-            <a:r>
-              <a:rPr lang="en-NZ" dirty="0" smtClean="0"/>
-              <a:t>Hoisting</a:t>
+              <a:t>The execution context - Creation and Hoisting</a:t>
             </a:r>
             <a:endParaRPr lang="en-NZ" dirty="0"/>
           </a:p>
@@ -4012,7 +4020,6 @@
               <a:rPr lang="en-NZ" dirty="0" smtClean="0"/>
               <a:t>First class functions – Everything you can do with other types you can do with functions</a:t>
             </a:r>
-            <a:endParaRPr lang="en-NZ" dirty="0" smtClean="0"/>
           </a:p>
           <a:p>
             <a:pPr>
@@ -4153,27 +4160,7 @@
           <a:p>
             <a:r>
               <a:rPr lang="en-NZ" dirty="0" smtClean="0"/>
-              <a:t>I</a:t>
-            </a:r>
-            <a:r>
-              <a:rPr lang="en-NZ" dirty="0" smtClean="0"/>
-              <a:t>mmediately </a:t>
-            </a:r>
-            <a:r>
-              <a:rPr lang="en-NZ" dirty="0" smtClean="0"/>
-              <a:t>I</a:t>
-            </a:r>
-            <a:r>
-              <a:rPr lang="en-NZ" dirty="0" smtClean="0"/>
-              <a:t>nvoked </a:t>
-            </a:r>
-            <a:r>
-              <a:rPr lang="en-NZ" dirty="0" smtClean="0"/>
-              <a:t>F</a:t>
-            </a:r>
-            <a:r>
-              <a:rPr lang="en-NZ" dirty="0" smtClean="0"/>
-              <a:t>unctions</a:t>
+              <a:t>Immediately Invoked Functions</a:t>
             </a:r>
             <a:endParaRPr lang="en-NZ" dirty="0"/>
           </a:p>
@@ -4198,15 +4185,7 @@
           <a:p>
             <a:r>
               <a:rPr lang="en-NZ" dirty="0" smtClean="0"/>
-              <a:t>An </a:t>
-            </a:r>
-            <a:r>
-              <a:rPr lang="en-NZ" dirty="0" smtClean="0"/>
-              <a:t>Immediately-Invoked </a:t>
-            </a:r>
-            <a:r>
-              <a:rPr lang="en-NZ" dirty="0" smtClean="0"/>
-              <a:t>Function Expression, or </a:t>
+              <a:t>An Immediately-Invoked Function Expression, or </a:t>
             </a:r>
             <a:r>
               <a:rPr lang="en-NZ" b="1" dirty="0" smtClean="0"/>
@@ -4214,19 +4193,7 @@
             </a:r>
             <a:r>
               <a:rPr lang="en-NZ" dirty="0" smtClean="0"/>
-              <a:t> for </a:t>
-            </a:r>
-            <a:r>
-              <a:rPr lang="en-NZ" dirty="0" smtClean="0"/>
-              <a:t>short is a function that </a:t>
-            </a:r>
-            <a:r>
-              <a:rPr lang="en-NZ" dirty="0" smtClean="0"/>
-              <a:t>executes immediately after it’s created</a:t>
-            </a:r>
-            <a:r>
-              <a:rPr lang="en-NZ" dirty="0" smtClean="0"/>
-              <a:t>.</a:t>
+              <a:t> for short is a function that executes immediately after it’s created.</a:t>
             </a:r>
           </a:p>
           <a:p>
@@ -4252,13 +4219,17 @@
             </a:pPr>
             <a:r>
               <a:rPr lang="en-NZ" dirty="0" smtClean="0"/>
-              <a:t>	</a:t>
-            </a:r>
+              <a:t>	;(functions () { </a:t>
+            </a:r>
+          </a:p>
+          <a:p>
+            <a:pPr>
+              <a:buNone/>
+            </a:pPr>
             <a:r>
               <a:rPr lang="en-NZ" dirty="0" smtClean="0"/>
-              <a:t>;(functions () { </a:t>
-            </a:r>
-            <a:endParaRPr lang="en-NZ" dirty="0" smtClean="0"/>
+              <a:t>		//Some stuff </a:t>
+            </a:r>
           </a:p>
           <a:p>
             <a:pPr>
@@ -4266,29 +4237,7 @@
             </a:pPr>
             <a:r>
               <a:rPr lang="en-NZ" dirty="0" smtClean="0"/>
-              <a:t>	</a:t>
-            </a:r>
-            <a:r>
-              <a:rPr lang="en-NZ" dirty="0" smtClean="0"/>
-              <a:t>	//</a:t>
-            </a:r>
-            <a:r>
-              <a:rPr lang="en-NZ" dirty="0" smtClean="0"/>
-              <a:t>Some stuff </a:t>
-            </a:r>
-            <a:endParaRPr lang="en-NZ" dirty="0" smtClean="0"/>
-          </a:p>
-          <a:p>
-            <a:pPr>
-              <a:buNone/>
-            </a:pPr>
-            <a:r>
-              <a:rPr lang="en-NZ" dirty="0" smtClean="0"/>
-              <a:t>	</a:t>
-            </a:r>
-            <a:r>
-              <a:rPr lang="en-NZ" dirty="0" smtClean="0"/>
-              <a:t>}());</a:t>
+              <a:t>	}());</a:t>
             </a:r>
             <a:endParaRPr lang="en-NZ" dirty="0"/>
           </a:p>

</xml_diff>

<commit_message>
Added closures to powerpoint and app.js
</commit_message>
<xml_diff>
--- a/JavaScriptTheWeirdParts.pptx
+++ b/JavaScriptTheWeirdParts.pptx
@@ -115,6 +115,22 @@
       </a:defRPr>
     </a:lvl9pPr>
   </p:defaultTextStyle>
+  <p:extLst>
+    <p:ext uri="{EFAFB233-063F-42B5-8137-9DF3F51BA10A}">
+      <p15:sldGuideLst xmlns:p15="http://schemas.microsoft.com/office/powerpoint/2012/main">
+        <p15:guide id="1" orient="horz" pos="2160">
+          <p15:clr>
+            <a:srgbClr val="A4A3A4"/>
+          </p15:clr>
+        </p15:guide>
+        <p15:guide id="2" pos="2880">
+          <p15:clr>
+            <a:srgbClr val="A4A3A4"/>
+          </p15:clr>
+        </p15:guide>
+      </p15:sldGuideLst>
+    </p:ext>
+  </p:extLst>
 </p:presentation>
 </file>
 
@@ -300,7 +316,7 @@
             <a:fld id="{5B692EA3-BDBA-4D44-B25E-98FB01FEC377}" type="datetimeFigureOut">
               <a:rPr lang="en-NZ" smtClean="0"/>
               <a:pPr/>
-              <a:t>12/07/2016</a:t>
+              <a:t>13/07/2016</a:t>
             </a:fld>
             <a:endParaRPr lang="en-NZ"/>
           </a:p>
@@ -467,7 +483,7 @@
             <a:fld id="{5B692EA3-BDBA-4D44-B25E-98FB01FEC377}" type="datetimeFigureOut">
               <a:rPr lang="en-NZ" smtClean="0"/>
               <a:pPr/>
-              <a:t>12/07/2016</a:t>
+              <a:t>13/07/2016</a:t>
             </a:fld>
             <a:endParaRPr lang="en-NZ"/>
           </a:p>
@@ -644,7 +660,7 @@
             <a:fld id="{5B692EA3-BDBA-4D44-B25E-98FB01FEC377}" type="datetimeFigureOut">
               <a:rPr lang="en-NZ" smtClean="0"/>
               <a:pPr/>
-              <a:t>12/07/2016</a:t>
+              <a:t>13/07/2016</a:t>
             </a:fld>
             <a:endParaRPr lang="en-NZ"/>
           </a:p>
@@ -811,7 +827,7 @@
             <a:fld id="{5B692EA3-BDBA-4D44-B25E-98FB01FEC377}" type="datetimeFigureOut">
               <a:rPr lang="en-NZ" smtClean="0"/>
               <a:pPr/>
-              <a:t>12/07/2016</a:t>
+              <a:t>13/07/2016</a:t>
             </a:fld>
             <a:endParaRPr lang="en-NZ"/>
           </a:p>
@@ -1054,7 +1070,7 @@
             <a:fld id="{5B692EA3-BDBA-4D44-B25E-98FB01FEC377}" type="datetimeFigureOut">
               <a:rPr lang="en-NZ" smtClean="0"/>
               <a:pPr/>
-              <a:t>12/07/2016</a:t>
+              <a:t>13/07/2016</a:t>
             </a:fld>
             <a:endParaRPr lang="en-NZ"/>
           </a:p>
@@ -1339,7 +1355,7 @@
             <a:fld id="{5B692EA3-BDBA-4D44-B25E-98FB01FEC377}" type="datetimeFigureOut">
               <a:rPr lang="en-NZ" smtClean="0"/>
               <a:pPr/>
-              <a:t>12/07/2016</a:t>
+              <a:t>13/07/2016</a:t>
             </a:fld>
             <a:endParaRPr lang="en-NZ"/>
           </a:p>
@@ -1758,7 +1774,7 @@
             <a:fld id="{5B692EA3-BDBA-4D44-B25E-98FB01FEC377}" type="datetimeFigureOut">
               <a:rPr lang="en-NZ" smtClean="0"/>
               <a:pPr/>
-              <a:t>12/07/2016</a:t>
+              <a:t>13/07/2016</a:t>
             </a:fld>
             <a:endParaRPr lang="en-NZ"/>
           </a:p>
@@ -1873,7 +1889,7 @@
             <a:fld id="{5B692EA3-BDBA-4D44-B25E-98FB01FEC377}" type="datetimeFigureOut">
               <a:rPr lang="en-NZ" smtClean="0"/>
               <a:pPr/>
-              <a:t>12/07/2016</a:t>
+              <a:t>13/07/2016</a:t>
             </a:fld>
             <a:endParaRPr lang="en-NZ"/>
           </a:p>
@@ -1965,7 +1981,7 @@
             <a:fld id="{5B692EA3-BDBA-4D44-B25E-98FB01FEC377}" type="datetimeFigureOut">
               <a:rPr lang="en-NZ" smtClean="0"/>
               <a:pPr/>
-              <a:t>12/07/2016</a:t>
+              <a:t>13/07/2016</a:t>
             </a:fld>
             <a:endParaRPr lang="en-NZ"/>
           </a:p>
@@ -2239,7 +2255,7 @@
             <a:fld id="{5B692EA3-BDBA-4D44-B25E-98FB01FEC377}" type="datetimeFigureOut">
               <a:rPr lang="en-NZ" smtClean="0"/>
               <a:pPr/>
-              <a:t>12/07/2016</a:t>
+              <a:t>13/07/2016</a:t>
             </a:fld>
             <a:endParaRPr lang="en-NZ"/>
           </a:p>
@@ -2489,7 +2505,7 @@
             <a:fld id="{5B692EA3-BDBA-4D44-B25E-98FB01FEC377}" type="datetimeFigureOut">
               <a:rPr lang="en-NZ" smtClean="0"/>
               <a:pPr/>
-              <a:t>12/07/2016</a:t>
+              <a:t>13/07/2016</a:t>
             </a:fld>
             <a:endParaRPr lang="en-NZ"/>
           </a:p>
@@ -2699,7 +2715,7 @@
             <a:fld id="{5B692EA3-BDBA-4D44-B25E-98FB01FEC377}" type="datetimeFigureOut">
               <a:rPr lang="en-NZ" smtClean="0"/>
               <a:pPr/>
-              <a:t>12/07/2016</a:t>
+              <a:t>13/07/2016</a:t>
             </a:fld>
             <a:endParaRPr lang="en-NZ"/>
           </a:p>
@@ -3158,11 +3174,7 @@
           <a:p>
             <a:r>
               <a:rPr lang="en-NZ" dirty="0" smtClean="0"/>
-              <a:t>P</a:t>
-            </a:r>
-            <a:r>
-              <a:rPr lang="en-NZ" dirty="0" smtClean="0"/>
-              <a:t>rototype</a:t>
+              <a:t>Prototype</a:t>
             </a:r>
             <a:endParaRPr lang="en-NZ" dirty="0"/>
           </a:p>
@@ -3240,8 +3252,12 @@
           <a:lstStyle/>
           <a:p>
             <a:r>
+              <a:rPr lang="en-NZ" dirty="0"/>
+              <a:t>C</a:t>
+            </a:r>
+            <a:r>
               <a:rPr lang="en-NZ" dirty="0" smtClean="0"/>
-              <a:t>closures</a:t>
+              <a:t>losures</a:t>
             </a:r>
             <a:endParaRPr lang="en-NZ" dirty="0"/>
           </a:p>
@@ -3257,12 +3273,51 @@
             <p:ph idx="1"/>
           </p:nvPr>
         </p:nvSpPr>
-        <p:spPr/>
-        <p:txBody>
-          <a:bodyPr/>
-          <a:lstStyle/>
-          <a:p>
-            <a:endParaRPr lang="en-NZ"/>
+        <p:spPr>
+          <a:xfrm>
+            <a:off x="457200" y="1340768"/>
+            <a:ext cx="8229600" cy="4785395"/>
+          </a:xfrm>
+        </p:spPr>
+        <p:txBody>
+          <a:bodyPr>
+            <a:normAutofit fontScale="85000" lnSpcReduction="10000"/>
+          </a:bodyPr>
+          <a:lstStyle/>
+          <a:p>
+            <a:r>
+              <a:rPr lang="en-US" dirty="0" smtClean="0"/>
+              <a:t>A </a:t>
+            </a:r>
+            <a:r>
+              <a:rPr lang="en-US" dirty="0"/>
+              <a:t>JavaScript closure is a function that has a pointer reference to a </a:t>
+            </a:r>
+            <a:r>
+              <a:rPr lang="en-US" dirty="0" smtClean="0"/>
+              <a:t>free/private </a:t>
+            </a:r>
+            <a:r>
+              <a:rPr lang="en-US" dirty="0"/>
+              <a:t>variable. A free variable is one that has fallen out of scope after its parent function has returned. However, if that outer function still has some reference to the free </a:t>
+            </a:r>
+            <a:r>
+              <a:rPr lang="en-US" dirty="0" err="1"/>
+              <a:t>var</a:t>
+            </a:r>
+            <a:r>
+              <a:rPr lang="en-US" dirty="0"/>
+              <a:t> (normally through a function that gets returned, or through a method property), the variable will not get garbage collected because it will have a non-zero reference count. Thus, from outside the function, we can still access the inner variable by means of the closure</a:t>
+            </a:r>
+            <a:r>
+              <a:rPr lang="en-US" dirty="0" smtClean="0"/>
+              <a:t>. </a:t>
+            </a:r>
+            <a:r>
+              <a:rPr lang="en-US" dirty="0"/>
+              <a:t>- https://www.youtube.com/watch?v=yiEeiMN2Khs</a:t>
+            </a:r>
+            <a:endParaRPr lang="en-NZ" dirty="0"/>
           </a:p>
         </p:txBody>
       </p:sp>

</xml_diff>